<commit_message>
Adds modification to the presentation
</commit_message>
<xml_diff>
--- a/Presentation.pptx
+++ b/Presentation.pptx
@@ -202,7 +202,7 @@
           <a:p>
             <a:fld id="{8EF11E1D-0090-41F5-A99B-6FBE4228C0BD}" type="datetimeFigureOut">
               <a:rPr lang="fr-FR" smtClean="0"/>
-              <a:t>15/01/2015</a:t>
+              <a:t>16/01/2015</a:t>
             </a:fld>
             <a:endParaRPr lang="fr-FR"/>
           </a:p>
@@ -937,7 +937,7 @@
           <a:p>
             <a:fld id="{BDA9BCFD-1673-46B0-A0B2-6FE3E7EE5289}" type="datetimeFigureOut">
               <a:rPr lang="fr-FR" smtClean="0"/>
-              <a:t>15/01/2015</a:t>
+              <a:t>16/01/2015</a:t>
             </a:fld>
             <a:endParaRPr lang="fr-FR"/>
           </a:p>
@@ -1107,7 +1107,7 @@
           <a:p>
             <a:fld id="{BDA9BCFD-1673-46B0-A0B2-6FE3E7EE5289}" type="datetimeFigureOut">
               <a:rPr lang="fr-FR" smtClean="0"/>
-              <a:t>15/01/2015</a:t>
+              <a:t>16/01/2015</a:t>
             </a:fld>
             <a:endParaRPr lang="fr-FR"/>
           </a:p>
@@ -1287,7 +1287,7 @@
           <a:p>
             <a:fld id="{BDA9BCFD-1673-46B0-A0B2-6FE3E7EE5289}" type="datetimeFigureOut">
               <a:rPr lang="fr-FR" smtClean="0"/>
-              <a:t>15/01/2015</a:t>
+              <a:t>16/01/2015</a:t>
             </a:fld>
             <a:endParaRPr lang="fr-FR"/>
           </a:p>
@@ -1457,7 +1457,7 @@
           <a:p>
             <a:fld id="{BDA9BCFD-1673-46B0-A0B2-6FE3E7EE5289}" type="datetimeFigureOut">
               <a:rPr lang="fr-FR" smtClean="0"/>
-              <a:t>15/01/2015</a:t>
+              <a:t>16/01/2015</a:t>
             </a:fld>
             <a:endParaRPr lang="fr-FR"/>
           </a:p>
@@ -1701,7 +1701,7 @@
           <a:p>
             <a:fld id="{BDA9BCFD-1673-46B0-A0B2-6FE3E7EE5289}" type="datetimeFigureOut">
               <a:rPr lang="fr-FR" smtClean="0"/>
-              <a:t>15/01/2015</a:t>
+              <a:t>16/01/2015</a:t>
             </a:fld>
             <a:endParaRPr lang="fr-FR"/>
           </a:p>
@@ -1933,7 +1933,7 @@
           <a:p>
             <a:fld id="{BDA9BCFD-1673-46B0-A0B2-6FE3E7EE5289}" type="datetimeFigureOut">
               <a:rPr lang="fr-FR" smtClean="0"/>
-              <a:t>15/01/2015</a:t>
+              <a:t>16/01/2015</a:t>
             </a:fld>
             <a:endParaRPr lang="fr-FR"/>
           </a:p>
@@ -2300,7 +2300,7 @@
           <a:p>
             <a:fld id="{BDA9BCFD-1673-46B0-A0B2-6FE3E7EE5289}" type="datetimeFigureOut">
               <a:rPr lang="fr-FR" smtClean="0"/>
-              <a:t>15/01/2015</a:t>
+              <a:t>16/01/2015</a:t>
             </a:fld>
             <a:endParaRPr lang="fr-FR"/>
           </a:p>
@@ -2418,7 +2418,7 @@
           <a:p>
             <a:fld id="{BDA9BCFD-1673-46B0-A0B2-6FE3E7EE5289}" type="datetimeFigureOut">
               <a:rPr lang="fr-FR" smtClean="0"/>
-              <a:t>15/01/2015</a:t>
+              <a:t>16/01/2015</a:t>
             </a:fld>
             <a:endParaRPr lang="fr-FR"/>
           </a:p>
@@ -2513,7 +2513,7 @@
           <a:p>
             <a:fld id="{BDA9BCFD-1673-46B0-A0B2-6FE3E7EE5289}" type="datetimeFigureOut">
               <a:rPr lang="fr-FR" smtClean="0"/>
-              <a:t>15/01/2015</a:t>
+              <a:t>16/01/2015</a:t>
             </a:fld>
             <a:endParaRPr lang="fr-FR"/>
           </a:p>
@@ -2790,7 +2790,7 @@
           <a:p>
             <a:fld id="{BDA9BCFD-1673-46B0-A0B2-6FE3E7EE5289}" type="datetimeFigureOut">
               <a:rPr lang="fr-FR" smtClean="0"/>
-              <a:t>15/01/2015</a:t>
+              <a:t>16/01/2015</a:t>
             </a:fld>
             <a:endParaRPr lang="fr-FR"/>
           </a:p>
@@ -3047,7 +3047,7 @@
           <a:p>
             <a:fld id="{BDA9BCFD-1673-46B0-A0B2-6FE3E7EE5289}" type="datetimeFigureOut">
               <a:rPr lang="fr-FR" smtClean="0"/>
-              <a:t>15/01/2015</a:t>
+              <a:t>16/01/2015</a:t>
             </a:fld>
             <a:endParaRPr lang="fr-FR"/>
           </a:p>
@@ -3269,7 +3269,7 @@
           <a:p>
             <a:fld id="{BDA9BCFD-1673-46B0-A0B2-6FE3E7EE5289}" type="datetimeFigureOut">
               <a:rPr lang="fr-FR" smtClean="0"/>
-              <a:t>15/01/2015</a:t>
+              <a:t>16/01/2015</a:t>
             </a:fld>
             <a:endParaRPr lang="fr-FR"/>
           </a:p>
@@ -3724,15 +3724,6 @@
               </a:rPr>
               <a:t>Small World</a:t>
             </a:r>
-            <a:endParaRPr lang="fr-FR" sz="4400" dirty="0" smtClean="0">
-              <a:solidFill>
-                <a:schemeClr val="tx1">
-                  <a:alpha val="70000"/>
-                </a:schemeClr>
-              </a:solidFill>
-              <a:latin typeface="Lato Heavy" panose="020F0902020204030203" pitchFamily="34" charset="0"/>
-              <a:cs typeface="Lato Heavy" panose="020F0902020204030203" pitchFamily="34" charset="0"/>
-            </a:endParaRPr>
           </a:p>
           <a:p>
             <a:pPr algn="ctr"/>
@@ -3819,17 +3810,7 @@
                 <a:latin typeface="Lato Light" panose="020F0402020204030203" pitchFamily="34" charset="0"/>
                 <a:cs typeface="Lato Light" panose="020F0402020204030203" pitchFamily="34" charset="0"/>
               </a:rPr>
-              <a:t>Hyukchan </a:t>
-            </a:r>
-            <a:r>
-              <a:rPr lang="fr-FR" sz="1600" dirty="0" smtClean="0">
-                <a:solidFill>
-                  <a:schemeClr val="bg1"/>
-                </a:solidFill>
-                <a:latin typeface="Lato Light" panose="020F0402020204030203" pitchFamily="34" charset="0"/>
-                <a:cs typeface="Lato Light" panose="020F0402020204030203" pitchFamily="34" charset="0"/>
-              </a:rPr>
-              <a:t>Kwon</a:t>
+              <a:t>Hyukchan Kwon</a:t>
             </a:r>
           </a:p>
           <a:p>
@@ -4558,13 +4539,13 @@
   <p:clrMapOvr>
     <a:masterClrMapping/>
   </p:clrMapOvr>
-  <mc:AlternateContent xmlns:mc="http://schemas.openxmlformats.org/markup-compatibility/2006">
-    <mc:Choice xmlns:p14="http://schemas.microsoft.com/office/powerpoint/2010/main" Requires="p14">
+  <mc:AlternateContent xmlns:mc="http://schemas.openxmlformats.org/markup-compatibility/2006" xmlns:p14="http://schemas.microsoft.com/office/powerpoint/2010/main">
+    <mc:Choice Requires="p14">
       <p:transition spd="med" p14:dur="700">
         <p:fade/>
       </p:transition>
     </mc:Choice>
-    <mc:Fallback>
+    <mc:Fallback xmlns="">
       <p:transition spd="med">
         <p:fade/>
       </p:transition>
@@ -4640,6 +4621,83 @@
               </a:solidFill>
               <a:latin typeface="Lato Light" panose="020F0402020204030203" pitchFamily="34" charset="0"/>
               <a:cs typeface="Lato Light" panose="020F0402020204030203" pitchFamily="34" charset="0"/>
+            </a:endParaRPr>
+          </a:p>
+        </p:txBody>
+      </p:sp>
+      <p:pic>
+        <p:nvPicPr>
+          <p:cNvPr id="3" name="Picture 2"/>
+          <p:cNvPicPr>
+            <a:picLocks noChangeAspect="1"/>
+          </p:cNvPicPr>
+          <p:nvPr/>
+        </p:nvPicPr>
+        <p:blipFill>
+          <a:blip r:embed="rId2" cstate="print">
+            <a:extLst>
+              <a:ext uri="{28A0092B-C50C-407E-A947-70E740481C1C}">
+                <a14:useLocalDpi xmlns:a14="http://schemas.microsoft.com/office/drawing/2010/main" val="0"/>
+              </a:ext>
+            </a:extLst>
+          </a:blip>
+          <a:stretch>
+            <a:fillRect/>
+          </a:stretch>
+        </p:blipFill>
+        <p:spPr>
+          <a:xfrm>
+            <a:off x="8720782" y="61495"/>
+            <a:ext cx="332996" cy="528761"/>
+          </a:xfrm>
+          <a:prstGeom prst="rect">
+            <a:avLst/>
+          </a:prstGeom>
+        </p:spPr>
+      </p:pic>
+      <p:sp>
+        <p:nvSpPr>
+          <p:cNvPr id="5" name="TextBox 4"/>
+          <p:cNvSpPr txBox="1"/>
+          <p:nvPr/>
+        </p:nvSpPr>
+        <p:spPr>
+          <a:xfrm>
+            <a:off x="8622564" y="71223"/>
+            <a:ext cx="521436" cy="307777"/>
+          </a:xfrm>
+          <a:prstGeom prst="rect">
+            <a:avLst/>
+          </a:prstGeom>
+          <a:noFill/>
+        </p:spPr>
+        <p:txBody>
+          <a:bodyPr wrap="none" rtlCol="0">
+            <a:noAutofit/>
+          </a:bodyPr>
+          <a:lstStyle/>
+          <a:p>
+            <a:pPr algn="ctr"/>
+            <a:r>
+              <a:rPr lang="fr-FR" sz="1400" dirty="0">
+                <a:solidFill>
+                  <a:schemeClr val="bg2">
+                    <a:lumMod val="25000"/>
+                  </a:schemeClr>
+                </a:solidFill>
+                <a:latin typeface="Lato" panose="020F0502020204030203" pitchFamily="34" charset="0"/>
+                <a:cs typeface="Lato" panose="020F0502020204030203" pitchFamily="34" charset="0"/>
+              </a:rPr>
+              <a:t>3</a:t>
+            </a:r>
+            <a:endParaRPr lang="fr-FR" sz="1400" dirty="0">
+              <a:solidFill>
+                <a:schemeClr val="bg2">
+                  <a:lumMod val="25000"/>
+                </a:schemeClr>
+              </a:solidFill>
+              <a:latin typeface="Lato" panose="020F0502020204030203" pitchFamily="34" charset="0"/>
+              <a:cs typeface="Lato" panose="020F0502020204030203" pitchFamily="34" charset="0"/>
             </a:endParaRPr>
           </a:p>
         </p:txBody>
@@ -4907,6 +4965,83 @@
           </a:p>
         </p:txBody>
       </p:sp>
+      <p:pic>
+        <p:nvPicPr>
+          <p:cNvPr id="6" name="Picture 5"/>
+          <p:cNvPicPr>
+            <a:picLocks noChangeAspect="1"/>
+          </p:cNvPicPr>
+          <p:nvPr/>
+        </p:nvPicPr>
+        <p:blipFill>
+          <a:blip r:embed="rId2" cstate="print">
+            <a:extLst>
+              <a:ext uri="{28A0092B-C50C-407E-A947-70E740481C1C}">
+                <a14:useLocalDpi xmlns:a14="http://schemas.microsoft.com/office/drawing/2010/main" val="0"/>
+              </a:ext>
+            </a:extLst>
+          </a:blip>
+          <a:stretch>
+            <a:fillRect/>
+          </a:stretch>
+        </p:blipFill>
+        <p:spPr>
+          <a:xfrm>
+            <a:off x="8720782" y="61495"/>
+            <a:ext cx="332996" cy="528761"/>
+          </a:xfrm>
+          <a:prstGeom prst="rect">
+            <a:avLst/>
+          </a:prstGeom>
+        </p:spPr>
+      </p:pic>
+      <p:sp>
+        <p:nvSpPr>
+          <p:cNvPr id="7" name="TextBox 6"/>
+          <p:cNvSpPr txBox="1"/>
+          <p:nvPr/>
+        </p:nvSpPr>
+        <p:spPr>
+          <a:xfrm>
+            <a:off x="8622564" y="71223"/>
+            <a:ext cx="521436" cy="307777"/>
+          </a:xfrm>
+          <a:prstGeom prst="rect">
+            <a:avLst/>
+          </a:prstGeom>
+          <a:noFill/>
+        </p:spPr>
+        <p:txBody>
+          <a:bodyPr wrap="none" rtlCol="0">
+            <a:noAutofit/>
+          </a:bodyPr>
+          <a:lstStyle/>
+          <a:p>
+            <a:pPr algn="ctr"/>
+            <a:r>
+              <a:rPr lang="fr-FR" sz="1400" dirty="0">
+                <a:solidFill>
+                  <a:schemeClr val="bg2">
+                    <a:lumMod val="25000"/>
+                  </a:schemeClr>
+                </a:solidFill>
+                <a:latin typeface="Lato" panose="020F0502020204030203" pitchFamily="34" charset="0"/>
+                <a:cs typeface="Lato" panose="020F0502020204030203" pitchFamily="34" charset="0"/>
+              </a:rPr>
+              <a:t>4</a:t>
+            </a:r>
+            <a:endParaRPr lang="fr-FR" sz="1400" dirty="0">
+              <a:solidFill>
+                <a:schemeClr val="bg2">
+                  <a:lumMod val="25000"/>
+                </a:schemeClr>
+              </a:solidFill>
+              <a:latin typeface="Lato" panose="020F0502020204030203" pitchFamily="34" charset="0"/>
+              <a:cs typeface="Lato" panose="020F0502020204030203" pitchFamily="34" charset="0"/>
+            </a:endParaRPr>
+          </a:p>
+        </p:txBody>
+      </p:sp>
     </p:spTree>
     <p:extLst>
       <p:ext uri="{BB962C8B-B14F-4D97-AF65-F5344CB8AC3E}">
@@ -5209,6 +5344,74 @@
                 <a:cs typeface="Lato Light" panose="020F0402020204030203" pitchFamily="34" charset="0"/>
               </a:rPr>
               <a:t>Temps dédié pour le projet assez faible dans l’emploi du temps</a:t>
+            </a:r>
+          </a:p>
+        </p:txBody>
+      </p:sp>
+      <p:pic>
+        <p:nvPicPr>
+          <p:cNvPr id="8" name="Picture 7"/>
+          <p:cNvPicPr>
+            <a:picLocks noChangeAspect="1"/>
+          </p:cNvPicPr>
+          <p:nvPr/>
+        </p:nvPicPr>
+        <p:blipFill>
+          <a:blip r:embed="rId3" cstate="print">
+            <a:extLst>
+              <a:ext uri="{28A0092B-C50C-407E-A947-70E740481C1C}">
+                <a14:useLocalDpi xmlns:a14="http://schemas.microsoft.com/office/drawing/2010/main" val="0"/>
+              </a:ext>
+            </a:extLst>
+          </a:blip>
+          <a:stretch>
+            <a:fillRect/>
+          </a:stretch>
+        </p:blipFill>
+        <p:spPr>
+          <a:xfrm>
+            <a:off x="8720782" y="61495"/>
+            <a:ext cx="332996" cy="528761"/>
+          </a:xfrm>
+          <a:prstGeom prst="rect">
+            <a:avLst/>
+          </a:prstGeom>
+        </p:spPr>
+      </p:pic>
+      <p:sp>
+        <p:nvSpPr>
+          <p:cNvPr id="9" name="TextBox 8"/>
+          <p:cNvSpPr txBox="1"/>
+          <p:nvPr/>
+        </p:nvSpPr>
+        <p:spPr>
+          <a:xfrm>
+            <a:off x="8622564" y="71223"/>
+            <a:ext cx="521436" cy="307777"/>
+          </a:xfrm>
+          <a:prstGeom prst="rect">
+            <a:avLst/>
+          </a:prstGeom>
+          <a:noFill/>
+        </p:spPr>
+        <p:txBody>
+          <a:bodyPr wrap="none" rtlCol="0">
+            <a:noAutofit/>
+          </a:bodyPr>
+          <a:lstStyle/>
+          <a:p>
+            <a:pPr algn="ctr"/>
+            <a:r>
+              <a:rPr lang="fr-FR" sz="1400" dirty="0" smtClean="0">
+                <a:solidFill>
+                  <a:schemeClr val="bg2">
+                    <a:lumMod val="25000"/>
+                  </a:schemeClr>
+                </a:solidFill>
+                <a:latin typeface="Lato" panose="020F0502020204030203" pitchFamily="34" charset="0"/>
+                <a:cs typeface="Lato" panose="020F0502020204030203" pitchFamily="34" charset="0"/>
+              </a:rPr>
+              <a:t>5</a:t>
             </a:r>
           </a:p>
         </p:txBody>

</xml_diff>

<commit_message>
Last modifications to the powerpoint
</commit_message>
<xml_diff>
--- a/Presentation.pptx
+++ b/Presentation.pptx
@@ -4139,7 +4139,27 @@
                 <a:latin typeface="Lato Light" panose="020F0402020204030203" pitchFamily="34" charset="0"/>
                 <a:cs typeface="Lato Light" panose="020F0402020204030203" pitchFamily="34" charset="0"/>
               </a:rPr>
-              <a:t>Logiciel de gestion de versions git (plus de 150 </a:t>
+              <a:t>Logiciel de gestion de versions </a:t>
+            </a:r>
+            <a:r>
+              <a:rPr lang="fr-FR" sz="2400" dirty="0" smtClean="0">
+                <a:solidFill>
+                  <a:schemeClr val="bg1"/>
+                </a:solidFill>
+                <a:latin typeface="Lato Light" panose="020F0402020204030203" pitchFamily="34" charset="0"/>
+                <a:cs typeface="Lato Light" panose="020F0402020204030203" pitchFamily="34" charset="0"/>
+              </a:rPr>
+              <a:t>Git </a:t>
+            </a:r>
+            <a:r>
+              <a:rPr lang="fr-FR" sz="2400" dirty="0" smtClean="0">
+                <a:solidFill>
+                  <a:schemeClr val="bg1"/>
+                </a:solidFill>
+                <a:latin typeface="Lato Light" panose="020F0402020204030203" pitchFamily="34" charset="0"/>
+                <a:cs typeface="Lato Light" panose="020F0402020204030203" pitchFamily="34" charset="0"/>
+              </a:rPr>
+              <a:t>(plus de 150 </a:t>
             </a:r>
             <a:r>
               <a:rPr lang="fr-FR" sz="2400" dirty="0" err="1" smtClean="0">
@@ -4301,8 +4321,17 @@
                 <a:latin typeface="Lato" panose="020F0502020204030203" pitchFamily="34" charset="0"/>
                 <a:cs typeface="Lato" panose="020F0502020204030203" pitchFamily="34" charset="0"/>
               </a:rPr>
-              <a:t>2</a:t>
-            </a:r>
+              <a:t>3</a:t>
+            </a:r>
+            <a:endParaRPr lang="fr-FR" sz="1400" dirty="0">
+              <a:solidFill>
+                <a:schemeClr val="bg2">
+                  <a:lumMod val="25000"/>
+                </a:schemeClr>
+              </a:solidFill>
+              <a:latin typeface="Lato" panose="020F0502020204030203" pitchFamily="34" charset="0"/>
+              <a:cs typeface="Lato" panose="020F0502020204030203" pitchFamily="34" charset="0"/>
+            </a:endParaRPr>
           </a:p>
         </p:txBody>
       </p:sp>
@@ -4688,7 +4717,7 @@
                 <a:latin typeface="Lato" panose="020F0502020204030203" pitchFamily="34" charset="0"/>
                 <a:cs typeface="Lato" panose="020F0502020204030203" pitchFamily="34" charset="0"/>
               </a:rPr>
-              <a:t>3</a:t>
+              <a:t>4</a:t>
             </a:r>
             <a:endParaRPr lang="fr-FR" sz="1400" dirty="0">
               <a:solidFill>
@@ -4953,7 +4982,17 @@
                 <a:latin typeface="Lato Light" panose="020F0402020204030203" pitchFamily="34" charset="0"/>
                 <a:cs typeface="Lato Light" panose="020F0402020204030203" pitchFamily="34" charset="0"/>
               </a:rPr>
-              <a:t>Utilisation de git</a:t>
+              <a:t>Utilisation de </a:t>
+            </a:r>
+            <a:r>
+              <a:rPr lang="fr-FR" sz="2400" dirty="0" smtClean="0">
+                <a:solidFill>
+                  <a:schemeClr val="bg1"/>
+                </a:solidFill>
+                <a:latin typeface="Lato Light" panose="020F0402020204030203" pitchFamily="34" charset="0"/>
+                <a:cs typeface="Lato Light" panose="020F0402020204030203" pitchFamily="34" charset="0"/>
+              </a:rPr>
+              <a:t>Git</a:t>
             </a:r>
             <a:endParaRPr lang="fr-FR" sz="2400" dirty="0">
               <a:solidFill>
@@ -5028,7 +5067,7 @@
                 <a:latin typeface="Lato" panose="020F0502020204030203" pitchFamily="34" charset="0"/>
                 <a:cs typeface="Lato" panose="020F0502020204030203" pitchFamily="34" charset="0"/>
               </a:rPr>
-              <a:t>4</a:t>
+              <a:t>5</a:t>
             </a:r>
             <a:endParaRPr lang="fr-FR" sz="1400" dirty="0">
               <a:solidFill>
@@ -5411,7 +5450,7 @@
                 <a:latin typeface="Lato" panose="020F0502020204030203" pitchFamily="34" charset="0"/>
                 <a:cs typeface="Lato" panose="020F0502020204030203" pitchFamily="34" charset="0"/>
               </a:rPr>
-              <a:t>5</a:t>
+              <a:t>6</a:t>
             </a:r>
           </a:p>
         </p:txBody>

</xml_diff>

<commit_message>
Adds game icon + final release
</commit_message>
<xml_diff>
--- a/Presentation.pptx
+++ b/Presentation.pptx
@@ -4014,7 +4014,7 @@
                 <a:latin typeface="Lato Heavy" panose="020F0902020204030203" pitchFamily="34" charset="0"/>
                 <a:cs typeface="Lato Heavy" panose="020F0902020204030203" pitchFamily="34" charset="0"/>
               </a:rPr>
-              <a:t>PLANIFICATION</a:t>
+              <a:t>ORGANISATION</a:t>
             </a:r>
             <a:r>
               <a:rPr lang="fr-FR" dirty="0" smtClean="0"/>
@@ -4104,7 +4104,7 @@
                 <a:latin typeface="Lato Light" panose="020F0402020204030203" pitchFamily="34" charset="0"/>
                 <a:cs typeface="Lato Light" panose="020F0402020204030203" pitchFamily="34" charset="0"/>
               </a:rPr>
-              <a:t>130</a:t>
+              <a:t>120</a:t>
             </a:r>
             <a:r>
               <a:rPr lang="fr-FR" sz="2400" dirty="0" smtClean="0">
@@ -4114,7 +4114,17 @@
                 <a:latin typeface="Lato Light" panose="020F0402020204030203" pitchFamily="34" charset="0"/>
                 <a:cs typeface="Lato Light" panose="020F0402020204030203" pitchFamily="34" charset="0"/>
               </a:rPr>
-              <a:t> heures de travail</a:t>
+              <a:t> </a:t>
+            </a:r>
+            <a:r>
+              <a:rPr lang="fr-FR" sz="2400" dirty="0" smtClean="0">
+                <a:solidFill>
+                  <a:schemeClr val="bg1"/>
+                </a:solidFill>
+                <a:latin typeface="Lato Light" panose="020F0402020204030203" pitchFamily="34" charset="0"/>
+                <a:cs typeface="Lato Light" panose="020F0402020204030203" pitchFamily="34" charset="0"/>
+              </a:rPr>
+              <a:t>heures de travail</a:t>
             </a:r>
           </a:p>
           <a:p>
@@ -4139,27 +4149,7 @@
                 <a:latin typeface="Lato Light" panose="020F0402020204030203" pitchFamily="34" charset="0"/>
                 <a:cs typeface="Lato Light" panose="020F0402020204030203" pitchFamily="34" charset="0"/>
               </a:rPr>
-              <a:t>Logiciel de gestion de versions </a:t>
-            </a:r>
-            <a:r>
-              <a:rPr lang="fr-FR" sz="2400" dirty="0" smtClean="0">
-                <a:solidFill>
-                  <a:schemeClr val="bg1"/>
-                </a:solidFill>
-                <a:latin typeface="Lato Light" panose="020F0402020204030203" pitchFamily="34" charset="0"/>
-                <a:cs typeface="Lato Light" panose="020F0402020204030203" pitchFamily="34" charset="0"/>
-              </a:rPr>
-              <a:t>Git </a:t>
-            </a:r>
-            <a:r>
-              <a:rPr lang="fr-FR" sz="2400" dirty="0" smtClean="0">
-                <a:solidFill>
-                  <a:schemeClr val="bg1"/>
-                </a:solidFill>
-                <a:latin typeface="Lato Light" panose="020F0402020204030203" pitchFamily="34" charset="0"/>
-                <a:cs typeface="Lato Light" panose="020F0402020204030203" pitchFamily="34" charset="0"/>
-              </a:rPr>
-              <a:t>(plus de 150 </a:t>
+              <a:t>Logiciel de gestion de versions Git (plus de 150 </a:t>
             </a:r>
             <a:r>
               <a:rPr lang="fr-FR" sz="2400" dirty="0" err="1" smtClean="0">
@@ -4204,8 +4194,25 @@
                 <a:latin typeface="Lato Light" panose="020F0402020204030203" pitchFamily="34" charset="0"/>
                 <a:cs typeface="Lato Light" panose="020F0402020204030203" pitchFamily="34" charset="0"/>
               </a:rPr>
-              <a:t>Augmentation de la productivité grâce à une bonne répartition des tâches</a:t>
-            </a:r>
+              <a:t>Augmentation de la productivité grâce à une bonne </a:t>
+            </a:r>
+            <a:r>
+              <a:rPr lang="fr-FR" sz="2400" dirty="0" smtClean="0">
+                <a:solidFill>
+                  <a:schemeClr val="bg1"/>
+                </a:solidFill>
+                <a:latin typeface="Lato Light" panose="020F0402020204030203" pitchFamily="34" charset="0"/>
+                <a:cs typeface="Lato Light" panose="020F0402020204030203" pitchFamily="34" charset="0"/>
+              </a:rPr>
+              <a:t> communication</a:t>
+            </a:r>
+            <a:endParaRPr lang="fr-FR" sz="2400" dirty="0" smtClean="0">
+              <a:solidFill>
+                <a:schemeClr val="bg1"/>
+              </a:solidFill>
+              <a:latin typeface="Lato Light" panose="020F0402020204030203" pitchFamily="34" charset="0"/>
+              <a:cs typeface="Lato Light" panose="020F0402020204030203" pitchFamily="34" charset="0"/>
+            </a:endParaRPr>
           </a:p>
         </p:txBody>
       </p:sp>
@@ -4323,15 +4330,6 @@
               </a:rPr>
               <a:t>3</a:t>
             </a:r>
-            <a:endParaRPr lang="fr-FR" sz="1400" dirty="0">
-              <a:solidFill>
-                <a:schemeClr val="bg2">
-                  <a:lumMod val="25000"/>
-                </a:schemeClr>
-              </a:solidFill>
-              <a:latin typeface="Lato" panose="020F0502020204030203" pitchFamily="34" charset="0"/>
-              <a:cs typeface="Lato" panose="020F0502020204030203" pitchFamily="34" charset="0"/>
-            </a:endParaRPr>
           </a:p>
         </p:txBody>
       </p:sp>
@@ -4428,7 +4426,17 @@
                 <a:latin typeface="Lato Light" panose="020F0402020204030203" pitchFamily="34" charset="0"/>
                 <a:cs typeface="Lato Light" panose="020F0402020204030203" pitchFamily="34" charset="0"/>
               </a:rPr>
-              <a:t>Interface claire et épurée</a:t>
+              <a:t>Interface </a:t>
+            </a:r>
+            <a:r>
+              <a:rPr lang="fr-FR" sz="2400" dirty="0" smtClean="0">
+                <a:solidFill>
+                  <a:schemeClr val="bg1"/>
+                </a:solidFill>
+                <a:latin typeface="Lato Light" panose="020F0402020204030203" pitchFamily="34" charset="0"/>
+                <a:cs typeface="Lato Light" panose="020F0402020204030203" pitchFamily="34" charset="0"/>
+              </a:rPr>
+              <a:t>claire</a:t>
             </a:r>
           </a:p>
           <a:p>
@@ -4453,8 +4461,15 @@
                 <a:latin typeface="Lato Light" panose="020F0402020204030203" pitchFamily="34" charset="0"/>
                 <a:cs typeface="Lato Light" panose="020F0402020204030203" pitchFamily="34" charset="0"/>
               </a:rPr>
-              <a:t>Plusieurs modes de jeu</a:t>
-            </a:r>
+              <a:t>Plusieurs choix de tailles de la carte</a:t>
+            </a:r>
+            <a:endParaRPr lang="fr-FR" sz="2400" dirty="0" smtClean="0">
+              <a:solidFill>
+                <a:schemeClr val="bg1"/>
+              </a:solidFill>
+              <a:latin typeface="Lato Light" panose="020F0402020204030203" pitchFamily="34" charset="0"/>
+              <a:cs typeface="Lato Light" panose="020F0402020204030203" pitchFamily="34" charset="0"/>
+            </a:endParaRPr>
           </a:p>
           <a:p>
             <a:pPr marL="342900" indent="-342900">
@@ -4553,8 +4568,15 @@
                 <a:latin typeface="Lato Light" panose="020F0402020204030203" pitchFamily="34" charset="0"/>
                 <a:cs typeface="Lato Light" panose="020F0402020204030203" pitchFamily="34" charset="0"/>
               </a:rPr>
-              <a:t>Affichage de messages du jeu</a:t>
-            </a:r>
+              <a:t>Un panel regroupant les messages du jeu</a:t>
+            </a:r>
+            <a:endParaRPr lang="fr-FR" sz="2400" dirty="0" smtClean="0">
+              <a:solidFill>
+                <a:schemeClr val="bg1"/>
+              </a:solidFill>
+              <a:latin typeface="Lato Light" panose="020F0402020204030203" pitchFamily="34" charset="0"/>
+              <a:cs typeface="Lato Light" panose="020F0402020204030203" pitchFamily="34" charset="0"/>
+            </a:endParaRPr>
           </a:p>
         </p:txBody>
       </p:sp>
@@ -4719,15 +4741,6 @@
               </a:rPr>
               <a:t>4</a:t>
             </a:r>
-            <a:endParaRPr lang="fr-FR" sz="1400" dirty="0">
-              <a:solidFill>
-                <a:schemeClr val="bg2">
-                  <a:lumMod val="25000"/>
-                </a:schemeClr>
-              </a:solidFill>
-              <a:latin typeface="Lato" panose="020F0502020204030203" pitchFamily="34" charset="0"/>
-              <a:cs typeface="Lato" panose="020F0502020204030203" pitchFamily="34" charset="0"/>
-            </a:endParaRPr>
           </a:p>
         </p:txBody>
       </p:sp>
@@ -4880,7 +4893,7 @@
                 <a:latin typeface="Lato Light" panose="020F0402020204030203" pitchFamily="34" charset="0"/>
                 <a:cs typeface="Lato Light" panose="020F0402020204030203" pitchFamily="34" charset="0"/>
               </a:rPr>
-              <a:t>Implémentation des patrons de conception</a:t>
+              <a:t>Modélisation d’un projet</a:t>
             </a:r>
           </a:p>
           <a:p>
@@ -4905,27 +4918,17 @@
                 <a:latin typeface="Lato Light" panose="020F0402020204030203" pitchFamily="34" charset="0"/>
                 <a:cs typeface="Lato Light" panose="020F0402020204030203" pitchFamily="34" charset="0"/>
               </a:rPr>
-              <a:t>Communication entre deux langages</a:t>
-            </a:r>
-            <a:r>
-              <a:rPr lang="fr-FR" sz="2400" dirty="0">
+              <a:t>Implémentation </a:t>
+            </a:r>
+            <a:r>
+              <a:rPr lang="fr-FR" sz="2400" dirty="0" smtClean="0">
                 <a:solidFill>
                   <a:schemeClr val="bg1"/>
                 </a:solidFill>
                 <a:latin typeface="Lato Light" panose="020F0402020204030203" pitchFamily="34" charset="0"/>
                 <a:cs typeface="Lato Light" panose="020F0402020204030203" pitchFamily="34" charset="0"/>
               </a:rPr>
-              <a:t> </a:t>
-            </a:r>
-            <a:r>
-              <a:rPr lang="fr-FR" sz="2400" dirty="0" smtClean="0">
-                <a:solidFill>
-                  <a:schemeClr val="bg1"/>
-                </a:solidFill>
-                <a:latin typeface="Lato Light" panose="020F0402020204030203" pitchFamily="34" charset="0"/>
-                <a:cs typeface="Lato Light" panose="020F0402020204030203" pitchFamily="34" charset="0"/>
-              </a:rPr>
-              <a:t>(C#, C++)</a:t>
+              <a:t>des patrons de conception</a:t>
             </a:r>
           </a:p>
           <a:p>
@@ -4950,15 +4953,28 @@
                 <a:latin typeface="Lato Light" panose="020F0402020204030203" pitchFamily="34" charset="0"/>
                 <a:cs typeface="Lato Light" panose="020F0402020204030203" pitchFamily="34" charset="0"/>
               </a:rPr>
-              <a:t>Création d’une interface graphique (WPF)</a:t>
-            </a:r>
-            <a:endParaRPr lang="fr-FR" sz="2400" dirty="0">
-              <a:solidFill>
-                <a:schemeClr val="bg1"/>
-              </a:solidFill>
-              <a:latin typeface="Lato Light" panose="020F0402020204030203" pitchFamily="34" charset="0"/>
-              <a:cs typeface="Lato Light" panose="020F0402020204030203" pitchFamily="34" charset="0"/>
-            </a:endParaRPr>
+              <a:t>Communication entre deux langages</a:t>
+            </a:r>
+            <a:r>
+              <a:rPr lang="fr-FR" sz="2400" dirty="0">
+                <a:solidFill>
+                  <a:schemeClr val="bg1"/>
+                </a:solidFill>
+                <a:latin typeface="Lato Light" panose="020F0402020204030203" pitchFamily="34" charset="0"/>
+                <a:cs typeface="Lato Light" panose="020F0402020204030203" pitchFamily="34" charset="0"/>
+              </a:rPr>
+              <a:t> </a:t>
+            </a:r>
+            <a:r>
+              <a:rPr lang="fr-FR" sz="2400" dirty="0" smtClean="0">
+                <a:solidFill>
+                  <a:schemeClr val="bg1"/>
+                </a:solidFill>
+                <a:latin typeface="Lato Light" panose="020F0402020204030203" pitchFamily="34" charset="0"/>
+                <a:cs typeface="Lato Light" panose="020F0402020204030203" pitchFamily="34" charset="0"/>
+              </a:rPr>
+              <a:t>(C#, C++)</a:t>
+            </a:r>
           </a:p>
           <a:p>
             <a:pPr marL="342900" indent="-342900">
@@ -4982,8 +4998,30 @@
                 <a:latin typeface="Lato Light" panose="020F0402020204030203" pitchFamily="34" charset="0"/>
                 <a:cs typeface="Lato Light" panose="020F0402020204030203" pitchFamily="34" charset="0"/>
               </a:rPr>
-              <a:t>Utilisation de </a:t>
-            </a:r>
+              <a:t>Création d’une interface graphique (WPF)</a:t>
+            </a:r>
+            <a:endParaRPr lang="fr-FR" sz="2400" dirty="0">
+              <a:solidFill>
+                <a:schemeClr val="bg1"/>
+              </a:solidFill>
+              <a:latin typeface="Lato Light" panose="020F0402020204030203" pitchFamily="34" charset="0"/>
+              <a:cs typeface="Lato Light" panose="020F0402020204030203" pitchFamily="34" charset="0"/>
+            </a:endParaRPr>
+          </a:p>
+          <a:p>
+            <a:pPr marL="342900" indent="-342900">
+              <a:lnSpc>
+                <a:spcPct val="150000"/>
+              </a:lnSpc>
+              <a:spcBef>
+                <a:spcPts val="75"/>
+              </a:spcBef>
+              <a:spcAft>
+                <a:spcPts val="75"/>
+              </a:spcAft>
+              <a:buFontTx/>
+              <a:buChar char="-"/>
+            </a:pPr>
             <a:r>
               <a:rPr lang="fr-FR" sz="2400" dirty="0" smtClean="0">
                 <a:solidFill>
@@ -4992,7 +5030,7 @@
                 <a:latin typeface="Lato Light" panose="020F0402020204030203" pitchFamily="34" charset="0"/>
                 <a:cs typeface="Lato Light" panose="020F0402020204030203" pitchFamily="34" charset="0"/>
               </a:rPr>
-              <a:t>Git</a:t>
+              <a:t>Utilisation de Git</a:t>
             </a:r>
             <a:endParaRPr lang="fr-FR" sz="2400" dirty="0">
               <a:solidFill>
@@ -5069,15 +5107,6 @@
               </a:rPr>
               <a:t>5</a:t>
             </a:r>
-            <a:endParaRPr lang="fr-FR" sz="1400" dirty="0">
-              <a:solidFill>
-                <a:schemeClr val="bg2">
-                  <a:lumMod val="25000"/>
-                </a:schemeClr>
-              </a:solidFill>
-              <a:latin typeface="Lato" panose="020F0502020204030203" pitchFamily="34" charset="0"/>
-              <a:cs typeface="Lato" panose="020F0502020204030203" pitchFamily="34" charset="0"/>
-            </a:endParaRPr>
           </a:p>
         </p:txBody>
       </p:sp>
@@ -5338,8 +5367,35 @@
                 <a:latin typeface="Lato Light" panose="020F0402020204030203" pitchFamily="34" charset="0"/>
                 <a:cs typeface="Lato Light" panose="020F0402020204030203" pitchFamily="34" charset="0"/>
               </a:rPr>
-              <a:t>Le cahier des charges pas très clair</a:t>
-            </a:r>
+              <a:t>Cahier des </a:t>
+            </a:r>
+            <a:r>
+              <a:rPr lang="fr-FR" sz="2400" dirty="0" smtClean="0">
+                <a:solidFill>
+                  <a:schemeClr val="bg1"/>
+                </a:solidFill>
+                <a:latin typeface="Lato Light" panose="020F0402020204030203" pitchFamily="34" charset="0"/>
+                <a:cs typeface="Lato Light" panose="020F0402020204030203" pitchFamily="34" charset="0"/>
+              </a:rPr>
+              <a:t>charges </a:t>
+            </a:r>
+            <a:r>
+              <a:rPr lang="fr-FR" sz="2400" dirty="0" smtClean="0">
+                <a:solidFill>
+                  <a:schemeClr val="bg1"/>
+                </a:solidFill>
+                <a:latin typeface="Lato Light" panose="020F0402020204030203" pitchFamily="34" charset="0"/>
+                <a:cs typeface="Lato Light" panose="020F0402020204030203" pitchFamily="34" charset="0"/>
+              </a:rPr>
+              <a:t>parfois ambigu</a:t>
+            </a:r>
+            <a:endParaRPr lang="fr-FR" sz="2400" dirty="0" smtClean="0">
+              <a:solidFill>
+                <a:schemeClr val="bg1"/>
+              </a:solidFill>
+              <a:latin typeface="Lato Light" panose="020F0402020204030203" pitchFamily="34" charset="0"/>
+              <a:cs typeface="Lato Light" panose="020F0402020204030203" pitchFamily="34" charset="0"/>
+            </a:endParaRPr>
           </a:p>
           <a:p>
             <a:pPr marL="342900" indent="-342900">

</xml_diff>